<commit_message>
taken out RDSI stuff
</commit_message>
<xml_diff>
--- a/package06/slides.pptx
+++ b/package06/slides.pptx
@@ -233,7 +233,7 @@
           <a:p>
             <a:fld id="{FB8F41F9-8CE9-2845-9859-875CFABCF188}" type="datetimeFigureOut">
               <a:rPr lang="en-US" smtClean="0"/>
-              <a:t>06/09/15</a:t>
+              <a:t>17/09/15</a:t>
             </a:fld>
             <a:endParaRPr lang="en-US"/>
           </a:p>
@@ -564,11 +564,7 @@
             </a:pPr>
             <a:r>
               <a:rPr lang="en-US" dirty="0" smtClean="0"/>
-              <a:t>NOTE: </a:t>
-            </a:r>
-            <a:r>
-              <a:rPr lang="en-US" dirty="0" smtClean="0"/>
-              <a:t>MPI </a:t>
+              <a:t>NOTE: MPI </a:t>
             </a:r>
             <a:r>
               <a:rPr lang="en-US" i="1" dirty="0" smtClean="0"/>
@@ -4188,7 +4184,7 @@
 </file>
 
 <file path=ppt/slides/slide21.xml><?xml version="1.0" encoding="utf-8"?>
-<p:sld xmlns:a="http://schemas.openxmlformats.org/drawingml/2006/main" xmlns:r="http://schemas.openxmlformats.org/officeDocument/2006/relationships" xmlns:p="http://schemas.openxmlformats.org/presentationml/2006/main">
+<p:sld xmlns:a="http://schemas.openxmlformats.org/drawingml/2006/main" xmlns:r="http://schemas.openxmlformats.org/officeDocument/2006/relationships" xmlns:p="http://schemas.openxmlformats.org/presentationml/2006/main" show="0">
   <p:cSld>
     <p:spTree>
       <p:nvGrpSpPr>
@@ -4220,8 +4216,20 @@
           <a:lstStyle/>
           <a:p>
             <a:r>
-              <a:rPr lang="en-US" smtClean="0"/>
-              <a:t>RDSI Storage</a:t>
+              <a:rPr lang="en-US" dirty="0" smtClean="0">
+                <a:solidFill>
+                  <a:srgbClr val="FF0000"/>
+                </a:solidFill>
+              </a:rPr>
+              <a:t>[OBSOLETE] </a:t>
+            </a:r>
+            <a:r>
+              <a:rPr lang="en-US" dirty="0" smtClean="0"/>
+              <a:t>RDSI </a:t>
+            </a:r>
+            <a:r>
+              <a:rPr lang="en-US" dirty="0" smtClean="0"/>
+              <a:t>Storage</a:t>
             </a:r>
             <a:endParaRPr lang="en-US" dirty="0"/>
           </a:p>
@@ -4306,11 +4314,19 @@
   <p:clrMapOvr>
     <a:masterClrMapping/>
   </p:clrMapOvr>
+  <mc:AlternateContent xmlns:mc="http://schemas.openxmlformats.org/markup-compatibility/2006">
+    <mc:Choice xmlns:p14="http://schemas.microsoft.com/office/powerpoint/2010/main" Requires="p14">
+      <p:transition spd="slow" p14:dur="2000"/>
+    </mc:Choice>
+    <mc:Fallback>
+      <p:transition xmlns:p14="http://schemas.microsoft.com/office/powerpoint/2010/main" spd="slow"/>
+    </mc:Fallback>
+  </mc:AlternateContent>
 </p:sld>
 </file>
 
 <file path=ppt/slides/slide22.xml><?xml version="1.0" encoding="utf-8"?>
-<p:sld xmlns:a="http://schemas.openxmlformats.org/drawingml/2006/main" xmlns:r="http://schemas.openxmlformats.org/officeDocument/2006/relationships" xmlns:p="http://schemas.openxmlformats.org/presentationml/2006/main">
+<p:sld xmlns:a="http://schemas.openxmlformats.org/drawingml/2006/main" xmlns:r="http://schemas.openxmlformats.org/officeDocument/2006/relationships" xmlns:p="http://schemas.openxmlformats.org/presentationml/2006/main" show="0">
   <p:cSld>
     <p:spTree>
       <p:nvGrpSpPr>
@@ -4342,8 +4358,20 @@
           <a:lstStyle/>
           <a:p>
             <a:r>
-              <a:rPr lang="en-US" smtClean="0"/>
-              <a:t>RDSI  Storage</a:t>
+              <a:rPr lang="en-US" dirty="0">
+                <a:solidFill>
+                  <a:srgbClr val="FF0000"/>
+                </a:solidFill>
+              </a:rPr>
+              <a:t>[OBSOLETE] </a:t>
+            </a:r>
+            <a:r>
+              <a:rPr lang="en-US" dirty="0" smtClean="0"/>
+              <a:t>RDSI  </a:t>
+            </a:r>
+            <a:r>
+              <a:rPr lang="en-US" dirty="0" smtClean="0"/>
+              <a:t>Storage</a:t>
             </a:r>
             <a:endParaRPr lang="en-US" dirty="0"/>
           </a:p>
@@ -4435,11 +4463,19 @@
   <p:clrMapOvr>
     <a:masterClrMapping/>
   </p:clrMapOvr>
+  <mc:AlternateContent xmlns:mc="http://schemas.openxmlformats.org/markup-compatibility/2006">
+    <mc:Choice xmlns:p14="http://schemas.microsoft.com/office/powerpoint/2010/main" Requires="p14">
+      <p:transition spd="slow" p14:dur="2000"/>
+    </mc:Choice>
+    <mc:Fallback>
+      <p:transition xmlns:p14="http://schemas.microsoft.com/office/powerpoint/2010/main" spd="slow"/>
+    </mc:Fallback>
+  </mc:AlternateContent>
 </p:sld>
 </file>
 
 <file path=ppt/slides/slide23.xml><?xml version="1.0" encoding="utf-8"?>
-<p:sld xmlns:a="http://schemas.openxmlformats.org/drawingml/2006/main" xmlns:r="http://schemas.openxmlformats.org/officeDocument/2006/relationships" xmlns:p="http://schemas.openxmlformats.org/presentationml/2006/main">
+<p:sld xmlns:a="http://schemas.openxmlformats.org/drawingml/2006/main" xmlns:r="http://schemas.openxmlformats.org/officeDocument/2006/relationships" xmlns:p="http://schemas.openxmlformats.org/presentationml/2006/main" show="0">
   <p:cSld>
     <p:spTree>
       <p:nvGrpSpPr>
@@ -4471,8 +4507,20 @@
           <a:lstStyle/>
           <a:p>
             <a:r>
-              <a:rPr lang="en-US" smtClean="0"/>
-              <a:t>RDSI Storage</a:t>
+              <a:rPr lang="en-US" dirty="0">
+                <a:solidFill>
+                  <a:srgbClr val="FF0000"/>
+                </a:solidFill>
+              </a:rPr>
+              <a:t>[OBSOLETE] </a:t>
+            </a:r>
+            <a:r>
+              <a:rPr lang="en-US" dirty="0" smtClean="0"/>
+              <a:t>RDSI </a:t>
+            </a:r>
+            <a:r>
+              <a:rPr lang="en-US" dirty="0" smtClean="0"/>
+              <a:t>Storage</a:t>
             </a:r>
             <a:endParaRPr lang="en-US" dirty="0"/>
           </a:p>
@@ -4572,6 +4620,14 @@
   <p:clrMapOvr>
     <a:masterClrMapping/>
   </p:clrMapOvr>
+  <mc:AlternateContent xmlns:mc="http://schemas.openxmlformats.org/markup-compatibility/2006">
+    <mc:Choice xmlns:p14="http://schemas.microsoft.com/office/powerpoint/2010/main" Requires="p14">
+      <p:transition spd="slow" p14:dur="2000"/>
+    </mc:Choice>
+    <mc:Fallback>
+      <p:transition xmlns:p14="http://schemas.microsoft.com/office/powerpoint/2010/main" spd="slow"/>
+    </mc:Fallback>
+  </mc:AlternateContent>
 </p:sld>
 </file>
 
@@ -4695,16 +4751,21 @@
             <a:pPr lvl="0"/>
             <a:r>
               <a:rPr lang="en-US" dirty="0" smtClean="0"/>
-              <a:t>For very large data demands, you may consider using Volumes, or try to get an </a:t>
-            </a:r>
-            <a:r>
-              <a:rPr lang="en-US" u="sng" dirty="0" smtClean="0"/>
-              <a:t>RDSI allocation</a:t>
-            </a:r>
-            <a:r>
-              <a:rPr lang="en-US" dirty="0" smtClean="0"/>
-              <a:t>. </a:t>
-            </a:r>
+              <a:t>For very large data demands, you may </a:t>
+            </a:r>
+            <a:r>
+              <a:rPr lang="en-US" dirty="0" smtClean="0"/>
+              <a:t>also consider </a:t>
+            </a:r>
+            <a:r>
+              <a:rPr lang="en-US" dirty="0" smtClean="0"/>
+              <a:t>using </a:t>
+            </a:r>
+            <a:r>
+              <a:rPr lang="en-US" dirty="0" smtClean="0"/>
+              <a:t>Volumes. </a:t>
+            </a:r>
+            <a:endParaRPr lang="en-US" dirty="0" smtClean="0"/>
           </a:p>
           <a:p>
             <a:endParaRPr lang="en-US" dirty="0"/>
@@ -6646,15 +6707,7 @@
             <a:pPr lvl="0"/>
             <a:r>
               <a:rPr lang="en-US" dirty="0" smtClean="0"/>
-              <a:t>If </a:t>
-            </a:r>
-            <a:r>
-              <a:rPr lang="en-US" dirty="0" smtClean="0"/>
-              <a:t>fast interconnects are not crucial, you can still benefit from running MPI programs in the </a:t>
-            </a:r>
-            <a:r>
-              <a:rPr lang="en-US" dirty="0" smtClean="0"/>
-              <a:t>Cloud.</a:t>
+              <a:t>If fast interconnects are not crucial, you can still benefit from running MPI programs in the Cloud.</a:t>
             </a:r>
             <a:endParaRPr lang="en-US" dirty="0"/>
           </a:p>

</xml_diff>